<commit_message>
report changes + ppt notes
</commit_message>
<xml_diff>
--- a/ppt/Universal Style transfer via Feature Transform.pptx
+++ b/ppt/Universal Style transfer via Feature Transform.pptx
@@ -206,7 +206,8 @@
           <a:p>
             <a:fld id="{43549712-63CD-4981-86EB-8B9B5B67AD3E}" type="datetimeFigureOut">
               <a:rPr lang="en-US" smtClean="0"/>
-              <a:t>23-Feb-19</a:t>
+              <a:pPr/>
+              <a:t>2/23/2019</a:t>
             </a:fld>
             <a:endParaRPr lang="en-US"/>
           </a:p>
@@ -367,6 +368,7 @@
           <a:p>
             <a:fld id="{D403C2C2-E16D-4CBA-8509-EAAB4FB7A708}" type="slidenum">
               <a:rPr lang="en-US" smtClean="0"/>
+              <a:pPr/>
               <a:t>‹#›</a:t>
             </a:fld>
             <a:endParaRPr lang="en-US"/>
@@ -376,7 +378,7 @@
     </p:spTree>
     <p:extLst>
       <p:ext uri="{BB962C8B-B14F-4D97-AF65-F5344CB8AC3E}">
-        <p14:creationId xmlns:p14="http://schemas.microsoft.com/office/powerpoint/2010/main" val="1046032239"/>
+        <p14:creationId xmlns:p14="http://schemas.microsoft.com/office/powerpoint/2010/main" xmlns="" val="1046032239"/>
       </p:ext>
     </p:extLst>
   </p:cSld>
@@ -522,19 +524,80 @@
           </a:bodyPr>
           <a:lstStyle/>
           <a:p>
+            <a:pPr>
+              <a:buFontTx/>
+              <a:buChar char="-"/>
+            </a:pPr>
             <a:r>
               <a:rPr lang="en-US" dirty="0" smtClean="0"/>
-              <a:t>- </a:t>
+              <a:t>Carmi</a:t>
             </a:r>
             <a:r>
               <a:rPr lang="en-US" dirty="0" smtClean="0"/>
-              <a:t>Carmi: Talk </a:t>
+              <a:t>: Talk about background for Style Transfer, look at related work and </a:t>
             </a:r>
             <a:r>
               <a:rPr lang="en-US" dirty="0" smtClean="0"/>
-              <a:t>about background for Style Transfer, look at related work and add</a:t>
-            </a:r>
-            <a:endParaRPr lang="en-US" dirty="0"/>
+              <a:t>add</a:t>
+            </a:r>
+            <a:endParaRPr lang="he-IL" dirty="0" smtClean="0"/>
+          </a:p>
+          <a:p>
+            <a:pPr algn="r">
+              <a:buFontTx/>
+              <a:buNone/>
+            </a:pPr>
+            <a:r>
+              <a:rPr lang="he-IL" dirty="0" smtClean="0"/>
+              <a:t>בעבודה</a:t>
+            </a:r>
+            <a:r>
+              <a:rPr lang="he-IL" baseline="0" dirty="0" smtClean="0"/>
+              <a:t> זו נציג מימוש של שיטה להעברת סטייל תוך שמירה על התוכן של תמונה אחרת.</a:t>
+            </a:r>
+          </a:p>
+          <a:p>
+            <a:pPr algn="r" rtl="1">
+              <a:buFontTx/>
+              <a:buNone/>
+            </a:pPr>
+            <a:r>
+              <a:rPr lang="he-IL" baseline="0" dirty="0" smtClean="0"/>
+              <a:t>העבודה מתבססת על מאמר שפורסם ב-</a:t>
+            </a:r>
+            <a:r>
+              <a:rPr lang="en-US" baseline="0" dirty="0" smtClean="0"/>
+              <a:t>NIPS</a:t>
+            </a:r>
+            <a:r>
+              <a:rPr lang="he-IL" baseline="0" dirty="0" smtClean="0"/>
+              <a:t> 2017.</a:t>
+            </a:r>
+          </a:p>
+          <a:p>
+            <a:pPr algn="r" rtl="1">
+              <a:buFontTx/>
+              <a:buNone/>
+            </a:pPr>
+            <a:r>
+              <a:rPr lang="he-IL" baseline="0" dirty="0" smtClean="0"/>
+              <a:t>הכוונה ב-</a:t>
+            </a:r>
+            <a:r>
+              <a:rPr lang="en-US" baseline="0" dirty="0" smtClean="0"/>
+              <a:t>Universal </a:t>
+            </a:r>
+            <a:r>
+              <a:rPr lang="he-IL" baseline="0" dirty="0" smtClean="0"/>
+              <a:t> היא שאיננו מגדירים מראש תמונת סטייל או תוכן.</a:t>
+            </a:r>
+          </a:p>
+          <a:p>
+            <a:pPr algn="r" rtl="1">
+              <a:buFontTx/>
+              <a:buNone/>
+            </a:pPr>
+            <a:endParaRPr lang="he-IL" baseline="0" dirty="0" smtClean="0"/>
           </a:p>
         </p:txBody>
       </p:sp>
@@ -555,6 +618,7 @@
           <a:p>
             <a:fld id="{D403C2C2-E16D-4CBA-8509-EAAB4FB7A708}" type="slidenum">
               <a:rPr lang="en-US" smtClean="0"/>
+              <a:pPr/>
               <a:t>1</a:t>
             </a:fld>
             <a:endParaRPr lang="en-US"/>
@@ -613,35 +677,48 @@
           <a:bodyPr/>
           <a:lstStyle/>
           <a:p>
-            <a:r>
-              <a:rPr lang="en-GB" dirty="0" smtClean="0"/>
-              <a:t>Carmi</a:t>
-            </a:r>
-          </a:p>
-          <a:p>
+            <a:pPr algn="r" rtl="1"/>
             <a:r>
               <a:rPr lang="he-IL" dirty="0" smtClean="0"/>
-              <a:t>להציג את האפשרות להעביר סטייל</a:t>
+              <a:t>במאמר מציגים</a:t>
             </a:r>
             <a:r>
               <a:rPr lang="he-IL" baseline="0" dirty="0" smtClean="0"/>
-              <a:t> משתי תמונות סטייל</a:t>
-            </a:r>
-          </a:p>
-          <a:p>
+              <a:t> שיטה לשילוב שתי תמונות סטייל שונות לתמונת תוכן אחת.</a:t>
+            </a:r>
+          </a:p>
+          <a:p>
+            <a:pPr algn="r" rtl="1"/>
             <a:r>
               <a:rPr lang="he-IL" baseline="0" dirty="0" smtClean="0"/>
-              <a:t>במסגרת </a:t>
-            </a:r>
-            <a:r>
-              <a:rPr lang="he-IL" baseline="0" dirty="0" err="1" smtClean="0"/>
-              <a:t>הפרוייקט</a:t>
-            </a:r>
+              <a:t>כחלק ממימוש של המאמר והשיטות השונות, ראינו שיש מקום לשיפור ושימוש במאפיינים הקיימים במקומות שונים בפייפליין על מנת לממש שילוב שתי תמונות סטייל.</a:t>
+            </a:r>
+          </a:p>
+          <a:p>
+            <a:pPr algn="r" rtl="1"/>
             <a:r>
               <a:rPr lang="he-IL" baseline="0" dirty="0" smtClean="0"/>
-              <a:t> בחנו שיטות נוספות לבצע את הפעולה בצורה יעילה יותר חישובית מהשיטה הקיימת</a:t>
-            </a:r>
-            <a:endParaRPr lang="en-GB" dirty="0"/>
+              <a:t>בחנו שיטות שונות על מנת לייעל את הפתרון המוצע ע"י שימוש סביר בקריאות לאלגוריתם </a:t>
+            </a:r>
+            <a:r>
+              <a:rPr lang="en-US" baseline="0" dirty="0" smtClean="0"/>
+              <a:t>SVD</a:t>
+            </a:r>
+            <a:r>
+              <a:rPr lang="he-IL" baseline="0" dirty="0" smtClean="0"/>
+              <a:t> שנחשב לצוואר בקבוק.</a:t>
+            </a:r>
+          </a:p>
+          <a:p>
+            <a:pPr algn="r" rtl="1"/>
+            <a:r>
+              <a:rPr lang="he-IL" baseline="0" dirty="0" smtClean="0"/>
+              <a:t>פיתחנו שלוש שיטות חדשות ויעילות יותר מזו המוצעת אשר מציעות שילוב סטיילים שונים תוך קבלת תוצאות איכותיות לא פחות מזו המוצעת במאמר.</a:t>
+            </a:r>
+          </a:p>
+          <a:p>
+            <a:pPr algn="r" rtl="1"/>
+            <a:endParaRPr lang="he-IL" baseline="0" dirty="0" smtClean="0"/>
           </a:p>
         </p:txBody>
       </p:sp>
@@ -662,6 +739,7 @@
           <a:p>
             <a:fld id="{D403C2C2-E16D-4CBA-8509-EAAB4FB7A708}" type="slidenum">
               <a:rPr lang="en-US" smtClean="0"/>
+              <a:pPr/>
               <a:t>10</a:t>
             </a:fld>
             <a:endParaRPr lang="en-US"/>
@@ -671,7 +749,7 @@
     </p:spTree>
     <p:extLst>
       <p:ext uri="{BB962C8B-B14F-4D97-AF65-F5344CB8AC3E}">
-        <p14:creationId xmlns:p14="http://schemas.microsoft.com/office/powerpoint/2010/main" val="2962976735"/>
+        <p14:creationId xmlns:p14="http://schemas.microsoft.com/office/powerpoint/2010/main" xmlns="" val="2962976735"/>
       </p:ext>
     </p:extLst>
   </p:cSld>
@@ -725,10 +803,161 @@
           <a:bodyPr/>
           <a:lstStyle/>
           <a:p>
+            <a:endParaRPr lang="he-IL" dirty="0" smtClean="0"/>
+          </a:p>
+          <a:p>
+            <a:pPr marL="0" marR="0" indent="0" algn="r" defTabSz="914400" rtl="1" eaLnBrk="1" fontAlgn="auto" latinLnBrk="0" hangingPunct="1">
+              <a:lnSpc>
+                <a:spcPct val="100000"/>
+              </a:lnSpc>
+              <a:spcBef>
+                <a:spcPts val="0"/>
+              </a:spcBef>
+              <a:spcAft>
+                <a:spcPts val="0"/>
+              </a:spcAft>
+              <a:buClrTx/>
+              <a:buSzTx/>
+              <a:buFontTx/>
+              <a:buNone/>
+              <a:tabLst/>
+              <a:defRPr/>
+            </a:pPr>
+            <a:r>
+              <a:rPr lang="he-IL" baseline="0" dirty="0" smtClean="0"/>
+              <a:t>השיטה שמוצגת במאמר מומשה על ידינו וזו מעבירה שתי תמונות סטייל ב-</a:t>
+            </a:r>
+            <a:r>
+              <a:rPr lang="en-US" baseline="0" dirty="0" smtClean="0"/>
+              <a:t>encoder</a:t>
+            </a:r>
+            <a:r>
+              <a:rPr lang="he-IL" baseline="0" dirty="0" smtClean="0"/>
+              <a:t>, לאחר מכן את תהליך ה-</a:t>
+            </a:r>
+            <a:r>
+              <a:rPr lang="en-US" baseline="0" dirty="0" smtClean="0"/>
+              <a:t>WCT</a:t>
+            </a:r>
+            <a:r>
+              <a:rPr lang="he-IL" baseline="0" dirty="0" smtClean="0"/>
+              <a:t> לכל אחת מתמונות הסטייל בנפרד.</a:t>
+            </a:r>
+          </a:p>
+          <a:p>
+            <a:pPr marL="0" marR="0" indent="0" algn="r" defTabSz="914400" rtl="1" eaLnBrk="1" fontAlgn="auto" latinLnBrk="0" hangingPunct="1">
+              <a:lnSpc>
+                <a:spcPct val="100000"/>
+              </a:lnSpc>
+              <a:spcBef>
+                <a:spcPts val="0"/>
+              </a:spcBef>
+              <a:spcAft>
+                <a:spcPts val="0"/>
+              </a:spcAft>
+              <a:buClrTx/>
+              <a:buSzTx/>
+              <a:buFontTx/>
+              <a:buNone/>
+              <a:tabLst/>
+              <a:defRPr/>
+            </a:pPr>
+            <a:r>
+              <a:rPr lang="he-IL" baseline="0" dirty="0" smtClean="0"/>
+              <a:t>כלומר, הלבנה של מאפייני תמונת התוכן וצביעה ע"י מאפייני תמונת הסטייל, כל אחת בנפרד.</a:t>
+            </a:r>
+          </a:p>
+          <a:p>
+            <a:pPr marL="0" marR="0" indent="0" algn="r" defTabSz="914400" rtl="1" eaLnBrk="1" fontAlgn="auto" latinLnBrk="0" hangingPunct="1">
+              <a:lnSpc>
+                <a:spcPct val="100000"/>
+              </a:lnSpc>
+              <a:spcBef>
+                <a:spcPts val="0"/>
+              </a:spcBef>
+              <a:spcAft>
+                <a:spcPts val="0"/>
+              </a:spcAft>
+              <a:buClrTx/>
+              <a:buSzTx/>
+              <a:buFontTx/>
+              <a:buNone/>
+              <a:tabLst/>
+              <a:defRPr/>
+            </a:pPr>
+            <a:r>
+              <a:rPr lang="he-IL" baseline="0" dirty="0" smtClean="0"/>
+              <a:t>במימוש זה נעשה שימוש ב-</a:t>
+            </a:r>
+            <a:r>
+              <a:rPr lang="en-US" baseline="0" dirty="0" smtClean="0"/>
+              <a:t>SVD</a:t>
+            </a:r>
+            <a:r>
+              <a:rPr lang="he-IL" baseline="0" dirty="0" smtClean="0"/>
+              <a:t> 4 פעמים, פעמיים עבור הלבנה ופעמיים עבור צביעה.</a:t>
+            </a:r>
+          </a:p>
+          <a:p>
+            <a:pPr marL="0" marR="0" indent="0" algn="r" defTabSz="914400" rtl="1" eaLnBrk="1" fontAlgn="auto" latinLnBrk="0" hangingPunct="1">
+              <a:lnSpc>
+                <a:spcPct val="100000"/>
+              </a:lnSpc>
+              <a:spcBef>
+                <a:spcPts val="0"/>
+              </a:spcBef>
+              <a:spcAft>
+                <a:spcPts val="0"/>
+              </a:spcAft>
+              <a:buClrTx/>
+              <a:buSzTx/>
+              <a:buFontTx/>
+              <a:buNone/>
+              <a:tabLst/>
+              <a:defRPr/>
+            </a:pPr>
+            <a:r>
+              <a:rPr lang="he-IL" baseline="0" dirty="0" smtClean="0"/>
+              <a:t>לבסוף, משתמשים באינטרפולציה של המאפיינים הצבועים על מנת לשלבם בתמונת המוצא.</a:t>
+            </a:r>
+          </a:p>
+          <a:p>
+            <a:pPr marL="0" marR="0" indent="0" algn="r" defTabSz="914400" rtl="1" eaLnBrk="1" fontAlgn="auto" latinLnBrk="0" hangingPunct="1">
+              <a:lnSpc>
+                <a:spcPct val="100000"/>
+              </a:lnSpc>
+              <a:spcBef>
+                <a:spcPts val="0"/>
+              </a:spcBef>
+              <a:spcAft>
+                <a:spcPts val="0"/>
+              </a:spcAft>
+              <a:buClrTx/>
+              <a:buSzTx/>
+              <a:buFontTx/>
+              <a:buNone/>
+              <a:tabLst/>
+              <a:defRPr/>
+            </a:pPr>
+            <a:r>
+              <a:rPr lang="he-IL" baseline="0" smtClean="0"/>
+              <a:t>ניתן להבין משקף זה כי אין צורך להלבין פעמיים את מאפייני תמונת התוכן ונראה כיצד מימשנו דרכים שונות ויעילות להעברת שתי תמונות סטייל שונות.</a:t>
+            </a:r>
+            <a:endParaRPr lang="en-GB" dirty="0" smtClean="0"/>
+          </a:p>
+          <a:p>
+            <a:pPr algn="r" rtl="1"/>
+            <a:endParaRPr lang="he-IL" dirty="0" smtClean="0"/>
+          </a:p>
+          <a:p>
+            <a:endParaRPr lang="he-IL" dirty="0" smtClean="0"/>
+          </a:p>
+          <a:p>
             <a:r>
               <a:rPr lang="en-GB" dirty="0" smtClean="0"/>
               <a:t>Carmi</a:t>
             </a:r>
+            <a:endParaRPr lang="en-GB" dirty="0" smtClean="0"/>
           </a:p>
           <a:p>
             <a:endParaRPr lang="en-GB" dirty="0" smtClean="0"/>
@@ -772,6 +1001,7 @@
           <a:p>
             <a:fld id="{D403C2C2-E16D-4CBA-8509-EAAB4FB7A708}" type="slidenum">
               <a:rPr lang="en-US" smtClean="0"/>
+              <a:pPr/>
               <a:t>11</a:t>
             </a:fld>
             <a:endParaRPr lang="en-US"/>
@@ -781,7 +1011,7 @@
     </p:spTree>
     <p:extLst>
       <p:ext uri="{BB962C8B-B14F-4D97-AF65-F5344CB8AC3E}">
-        <p14:creationId xmlns:p14="http://schemas.microsoft.com/office/powerpoint/2010/main" val="4221968118"/>
+        <p14:creationId xmlns:p14="http://schemas.microsoft.com/office/powerpoint/2010/main" xmlns="" val="4221968118"/>
       </p:ext>
     </p:extLst>
   </p:cSld>
@@ -867,6 +1097,7 @@
           <a:p>
             <a:fld id="{D403C2C2-E16D-4CBA-8509-EAAB4FB7A708}" type="slidenum">
               <a:rPr lang="en-US" smtClean="0"/>
+              <a:pPr/>
               <a:t>12</a:t>
             </a:fld>
             <a:endParaRPr lang="en-US"/>
@@ -876,7 +1107,7 @@
     </p:spTree>
     <p:extLst>
       <p:ext uri="{BB962C8B-B14F-4D97-AF65-F5344CB8AC3E}">
-        <p14:creationId xmlns:p14="http://schemas.microsoft.com/office/powerpoint/2010/main" val="97229603"/>
+        <p14:creationId xmlns:p14="http://schemas.microsoft.com/office/powerpoint/2010/main" xmlns="" val="97229603"/>
       </p:ext>
     </p:extLst>
   </p:cSld>
@@ -981,6 +1212,7 @@
           <a:p>
             <a:fld id="{D403C2C2-E16D-4CBA-8509-EAAB4FB7A708}" type="slidenum">
               <a:rPr lang="en-US" smtClean="0"/>
+              <a:pPr/>
               <a:t>13</a:t>
             </a:fld>
             <a:endParaRPr lang="en-US"/>
@@ -990,7 +1222,7 @@
     </p:spTree>
     <p:extLst>
       <p:ext uri="{BB962C8B-B14F-4D97-AF65-F5344CB8AC3E}">
-        <p14:creationId xmlns:p14="http://schemas.microsoft.com/office/powerpoint/2010/main" val="639567519"/>
+        <p14:creationId xmlns:p14="http://schemas.microsoft.com/office/powerpoint/2010/main" xmlns="" val="639567519"/>
       </p:ext>
     </p:extLst>
   </p:cSld>
@@ -1076,6 +1308,7 @@
           <a:p>
             <a:fld id="{D403C2C2-E16D-4CBA-8509-EAAB4FB7A708}" type="slidenum">
               <a:rPr lang="en-US" smtClean="0"/>
+              <a:pPr/>
               <a:t>14</a:t>
             </a:fld>
             <a:endParaRPr lang="en-US"/>
@@ -1085,7 +1318,7 @@
     </p:spTree>
     <p:extLst>
       <p:ext uri="{BB962C8B-B14F-4D97-AF65-F5344CB8AC3E}">
-        <p14:creationId xmlns:p14="http://schemas.microsoft.com/office/powerpoint/2010/main" val="2500915560"/>
+        <p14:creationId xmlns:p14="http://schemas.microsoft.com/office/powerpoint/2010/main" xmlns="" val="2500915560"/>
       </p:ext>
     </p:extLst>
   </p:cSld>
@@ -1141,19 +1374,124 @@
           </a:bodyPr>
           <a:lstStyle/>
           <a:p>
-            <a:pPr>
+            <a:pPr algn="r" rtl="1">
               <a:buFontTx/>
-              <a:buChar char="-"/>
+              <a:buNone/>
             </a:pPr>
             <a:r>
-              <a:rPr lang="en-US" dirty="0" smtClean="0"/>
-              <a:t> </a:t>
-            </a:r>
-            <a:r>
-              <a:rPr lang="en-US" dirty="0" smtClean="0"/>
-              <a:t>Carmi</a:t>
-            </a:r>
-            <a:endParaRPr lang="en-US" dirty="0"/>
+              <a:rPr lang="he-IL" dirty="0" smtClean="0"/>
+              <a:t>כרמי:</a:t>
+            </a:r>
+          </a:p>
+          <a:p>
+            <a:pPr algn="r" rtl="1">
+              <a:buFontTx/>
+              <a:buNone/>
+            </a:pPr>
+            <a:r>
+              <a:rPr lang="he-IL" dirty="0" smtClean="0"/>
+              <a:t>בעבודה</a:t>
+            </a:r>
+            <a:r>
+              <a:rPr lang="he-IL" baseline="0" dirty="0" smtClean="0"/>
+              <a:t> זו מימשנו כלי תוכנה ב</a:t>
+            </a:r>
+            <a:r>
+              <a:rPr lang="en-US" baseline="0" dirty="0" err="1" smtClean="0"/>
+              <a:t>PyTorch</a:t>
+            </a:r>
+            <a:r>
+              <a:rPr lang="he-IL" baseline="0" dirty="0" smtClean="0"/>
+              <a:t> אשר מאפשר העברת סטייל או זוג תמונות סטייל שונות אל תמונת תוכן.</a:t>
+            </a:r>
+          </a:p>
+          <a:p>
+            <a:pPr algn="r" rtl="1">
+              <a:buFontTx/>
+              <a:buNone/>
+            </a:pPr>
+            <a:r>
+              <a:rPr lang="he-IL" baseline="0" dirty="0" smtClean="0"/>
+              <a:t>בכלי ישנן אפשרויות שונות כגון שליטה ברמת העברת הסטייל, שימוש בארכיטקטורות ומודלים שונים ונדבר על כך בהמשך.</a:t>
+            </a:r>
+          </a:p>
+          <a:p>
+            <a:pPr algn="r" rtl="1">
+              <a:buFontTx/>
+              <a:buNone/>
+            </a:pPr>
+            <a:r>
+              <a:rPr lang="he-IL" baseline="0" dirty="0" smtClean="0"/>
+              <a:t>מלבד מימוש האלגוריתם שהוצע ע"י </a:t>
+            </a:r>
+            <a:r>
+              <a:rPr lang="en-US" baseline="0" dirty="0" smtClean="0"/>
+              <a:t>Li et al.</a:t>
+            </a:r>
+            <a:r>
+              <a:rPr lang="he-IL" baseline="0" dirty="0" smtClean="0"/>
+              <a:t> ב-</a:t>
+            </a:r>
+            <a:r>
+              <a:rPr lang="en-US" baseline="0" dirty="0" smtClean="0"/>
+              <a:t>NIPS 2017</a:t>
+            </a:r>
+            <a:r>
+              <a:rPr lang="he-IL" baseline="0" dirty="0" smtClean="0"/>
+              <a:t>, פיתחנו שיטה חדשנית להגברת הסטייל בתמונת התוכן</a:t>
+            </a:r>
+          </a:p>
+          <a:p>
+            <a:pPr algn="r" rtl="1">
+              <a:buFontTx/>
+              <a:buNone/>
+            </a:pPr>
+            <a:r>
+              <a:rPr lang="he-IL" baseline="0" dirty="0" smtClean="0"/>
+              <a:t>כמו כן, פיתחנו 3 שיטות חדשניות ויעילות יותר מזו המוצעת במאמר לשילוב 2 סטיילים שונים בתמונת תוכן.</a:t>
+            </a:r>
+          </a:p>
+          <a:p>
+            <a:pPr algn="r" rtl="1">
+              <a:buFontTx/>
+              <a:buNone/>
+            </a:pPr>
+            <a:endParaRPr lang="he-IL" baseline="0" dirty="0" smtClean="0"/>
+          </a:p>
+          <a:p>
+            <a:pPr algn="r" rtl="1">
+              <a:buFontTx/>
+              <a:buNone/>
+            </a:pPr>
+            <a:r>
+              <a:rPr lang="he-IL" dirty="0" smtClean="0"/>
+              <a:t>בנושא של העברת סטייל ישנו</a:t>
+            </a:r>
+            <a:r>
+              <a:rPr lang="he-IL" baseline="0" dirty="0" smtClean="0"/>
+              <a:t> מחקר ועבודות רבות. מרבית העבודות ממומשות להעברת סטייל ספציפי כגון תאורה ואינן וריאביליות לכל סטייל.</a:t>
+            </a:r>
+          </a:p>
+          <a:p>
+            <a:pPr algn="r" rtl="1">
+              <a:buFontTx/>
+              <a:buNone/>
+            </a:pPr>
+            <a:r>
+              <a:rPr lang="he-IL" baseline="0" dirty="0" smtClean="0"/>
+              <a:t>עבודות אחרונות שנעשו הציגו העברת סטייל שרירותי ע"י נירמול אדפטיבי של מאפייני תמונת התוכן ע"י אלו של תמונת הסטייל.</a:t>
+            </a:r>
+          </a:p>
+          <a:p>
+            <a:pPr algn="r" rtl="1">
+              <a:buFontTx/>
+              <a:buNone/>
+            </a:pPr>
+            <a:r>
+              <a:rPr lang="he-IL" baseline="0" dirty="0" smtClean="0"/>
+              <a:t>על פתרון זה ניתן להסתכל כשערוך של תהליך הלבנה וצביעה.</a:t>
+            </a:r>
+            <a:endParaRPr lang="he-IL" dirty="0"/>
           </a:p>
         </p:txBody>
       </p:sp>
@@ -1174,6 +1512,7 @@
           <a:p>
             <a:fld id="{D403C2C2-E16D-4CBA-8509-EAAB4FB7A708}" type="slidenum">
               <a:rPr lang="en-US" smtClean="0"/>
+              <a:pPr/>
               <a:t>2</a:t>
             </a:fld>
             <a:endParaRPr lang="en-US"/>
@@ -1234,45 +1573,243 @@
           </a:bodyPr>
           <a:lstStyle/>
           <a:p>
-            <a:pPr>
+            <a:pPr algn="r" rtl="1">
               <a:buFontTx/>
-              <a:buChar char="-"/>
+              <a:buNone/>
             </a:pPr>
             <a:r>
-              <a:rPr lang="en-US" dirty="0" smtClean="0"/>
-              <a:t> Carmi </a:t>
-            </a:r>
-          </a:p>
-          <a:p>
-            <a:pPr>
+              <a:rPr lang="he-IL" dirty="0" smtClean="0"/>
+              <a:t>כרמי:</a:t>
+            </a:r>
+          </a:p>
+          <a:p>
+            <a:pPr algn="r" rtl="1">
               <a:buFontTx/>
-              <a:buChar char="-"/>
+              <a:buNone/>
             </a:pPr>
             <a:r>
-              <a:rPr lang="en-US" dirty="0" smtClean="0"/>
-              <a:t> Our implementation for </a:t>
-            </a:r>
-            <a:r>
-              <a:rPr lang="en-US" dirty="0" smtClean="0"/>
-              <a:t>UST is based on encoder-decoder neural</a:t>
+              <a:rPr lang="he-IL" baseline="0" dirty="0" smtClean="0"/>
+              <a:t>תמונת תוכן – </a:t>
             </a:r>
             <a:r>
               <a:rPr lang="en-US" baseline="0" dirty="0" smtClean="0"/>
-              <a:t> network. </a:t>
-            </a:r>
-          </a:p>
-          <a:p>
-            <a:pPr>
+              <a:t>content image</a:t>
+            </a:r>
+            <a:r>
+              <a:rPr lang="he-IL" baseline="0" dirty="0" smtClean="0"/>
+              <a:t> מכילה פרטים הקיימים בתמונה שבד"כ ניתנים לכימות כמו למשל, צורות, מבנים ואובייקטים שונים.</a:t>
+            </a:r>
+          </a:p>
+          <a:p>
+            <a:pPr algn="r" rtl="1">
               <a:buFontTx/>
-              <a:buChar char="-"/>
+              <a:buNone/>
             </a:pPr>
             <a:r>
+              <a:rPr lang="he-IL" baseline="0" dirty="0" smtClean="0"/>
+              <a:t>לעומת זאת, הסטייל בתמונה, בעל משמעות חשובה לא פחות מזו של התוכן, למרות שבאפליקציות רבות ב-</a:t>
+            </a:r>
+            <a:r>
               <a:rPr lang="en-US" baseline="0" dirty="0" smtClean="0"/>
-              <a:t> Explain what is content, what is style, talk about decoder, encoder and the need of them. What is Feature Transform</a:t>
-            </a:r>
-          </a:p>
-          <a:p>
-            <a:pPr>
+              <a:t>computer vision</a:t>
+            </a:r>
+            <a:r>
+              <a:rPr lang="he-IL" baseline="0" dirty="0" smtClean="0"/>
+              <a:t> מיוחסת לו חשיבות נמוכה יותר – </a:t>
+            </a:r>
+          </a:p>
+          <a:p>
+            <a:pPr algn="r" rtl="1">
+              <a:buFontTx/>
+              <a:buNone/>
+            </a:pPr>
+            <a:r>
+              <a:rPr lang="he-IL" baseline="0" dirty="0" smtClean="0"/>
+              <a:t>מכיל טקסטורה, צבע ומאפיינים ויזואליים שונים הקשורים לגוונים.</a:t>
+            </a:r>
+          </a:p>
+          <a:p>
+            <a:pPr algn="r" rtl="1">
+              <a:buFontTx/>
+              <a:buNone/>
+            </a:pPr>
+            <a:r>
+              <a:rPr lang="he-IL" baseline="0" dirty="0" smtClean="0"/>
+              <a:t>בעבודה זו מימשנו אלגוריתם אשר מפריד את הסטייל מתמונת התוכן ומשלב סטייל מתמונה אחרת בתמונת התוכן.</a:t>
+            </a:r>
+          </a:p>
+          <a:p>
+            <a:pPr algn="r" rtl="1">
+              <a:buFontTx/>
+              <a:buNone/>
+            </a:pPr>
+            <a:r>
+              <a:rPr lang="he-IL" baseline="0" dirty="0" smtClean="0"/>
+              <a:t>אלגוריתם זה מבוסס על רשתות קונבולוציה מסוג </a:t>
+            </a:r>
+            <a:r>
+              <a:rPr lang="en-US" baseline="0" dirty="0" smtClean="0"/>
+              <a:t>encoder-decoder</a:t>
+            </a:r>
+            <a:r>
+              <a:rPr lang="he-IL" baseline="0" dirty="0" smtClean="0"/>
+              <a:t> </a:t>
+            </a:r>
+            <a:endParaRPr lang="en-US" baseline="0" dirty="0" smtClean="0"/>
+          </a:p>
+          <a:p>
+            <a:pPr algn="r" rtl="1">
+              <a:buFontTx/>
+              <a:buNone/>
+            </a:pPr>
+            <a:r>
+              <a:rPr lang="he-IL" baseline="0" dirty="0" smtClean="0"/>
+              <a:t>השימוש ב</a:t>
+            </a:r>
+            <a:r>
+              <a:rPr lang="en-US" baseline="0" dirty="0" smtClean="0"/>
+              <a:t>encoder</a:t>
+            </a:r>
+            <a:r>
+              <a:rPr lang="he-IL" baseline="0" dirty="0" smtClean="0"/>
+              <a:t> נעשה על מנת לחלץ ייצוג רחב של מאפיינים אשר ישמשו הן עבור תמונת הסטייל והן עבור תמונת התוכן כך שבשלב התאמת המאפיינים של התמונות, נקבל תאימות טובה מספיק עבור הפרטים הקטנים בתמונות. </a:t>
+            </a:r>
+            <a:r>
+              <a:rPr lang="en-US" baseline="0" dirty="0" smtClean="0"/>
+              <a:t> </a:t>
+            </a:r>
+            <a:endParaRPr lang="he-IL" baseline="0" dirty="0" smtClean="0"/>
+          </a:p>
+          <a:p>
+            <a:pPr algn="r" rtl="1">
+              <a:buFontTx/>
+              <a:buNone/>
+            </a:pPr>
+            <a:r>
+              <a:rPr lang="he-IL" baseline="0" dirty="0" smtClean="0"/>
+              <a:t>השימוש ב-</a:t>
+            </a:r>
+            <a:r>
+              <a:rPr lang="en-US" baseline="0" dirty="0" smtClean="0"/>
+              <a:t>decoder </a:t>
+            </a:r>
+            <a:r>
+              <a:rPr lang="he-IL" baseline="0" dirty="0" smtClean="0"/>
+              <a:t> סימטרי ל-</a:t>
+            </a:r>
+            <a:r>
+              <a:rPr lang="en-US" baseline="0" dirty="0" smtClean="0"/>
+              <a:t> encoder </a:t>
+            </a:r>
+            <a:r>
+              <a:rPr lang="he-IL" baseline="0" dirty="0" smtClean="0"/>
+              <a:t>נעשה על מנת לבצע שיחזור מדויק של התמונה מתוך ייצוג מאפיינים אשר מתקבל כ </a:t>
+            </a:r>
+            <a:r>
+              <a:rPr lang="en-US" baseline="0" dirty="0" smtClean="0"/>
+              <a:t>input</a:t>
+            </a:r>
+            <a:r>
+              <a:rPr lang="he-IL" baseline="0" dirty="0" smtClean="0"/>
+              <a:t> ל-</a:t>
+            </a:r>
+            <a:r>
+              <a:rPr lang="en-US" baseline="0" dirty="0" smtClean="0"/>
+              <a:t>decoder</a:t>
+            </a:r>
+            <a:r>
+              <a:rPr lang="he-IL" baseline="0" dirty="0" smtClean="0"/>
+              <a:t>.</a:t>
+            </a:r>
+          </a:p>
+          <a:p>
+            <a:pPr algn="r" rtl="1">
+              <a:buFontTx/>
+              <a:buNone/>
+            </a:pPr>
+            <a:r>
+              <a:rPr lang="he-IL" baseline="0" dirty="0" smtClean="0"/>
+              <a:t>במאמר שמימשנו נעשה שימוש ב-</a:t>
+            </a:r>
+            <a:r>
+              <a:rPr lang="en-US" baseline="0" dirty="0" smtClean="0"/>
+              <a:t>encoder</a:t>
+            </a:r>
+            <a:r>
+              <a:rPr lang="he-IL" baseline="0" dirty="0" smtClean="0"/>
+              <a:t> </a:t>
+            </a:r>
+            <a:r>
+              <a:rPr lang="en-US" baseline="0" dirty="0" smtClean="0"/>
+              <a:t> </a:t>
+            </a:r>
+            <a:r>
+              <a:rPr lang="he-IL" baseline="0" dirty="0" smtClean="0"/>
+              <a:t>מסוג </a:t>
+            </a:r>
+            <a:r>
+              <a:rPr lang="en-US" baseline="0" dirty="0" smtClean="0"/>
+              <a:t>VGG-19 </a:t>
+            </a:r>
+            <a:r>
+              <a:rPr lang="he-IL" baseline="0" dirty="0" smtClean="0"/>
+              <a:t> </a:t>
+            </a:r>
+          </a:p>
+          <a:p>
+            <a:pPr algn="r" rtl="1">
+              <a:buFontTx/>
+              <a:buNone/>
+            </a:pPr>
+            <a:endParaRPr lang="he-IL" baseline="0" dirty="0" smtClean="0"/>
+          </a:p>
+          <a:p>
+            <a:pPr algn="r" rtl="1">
+              <a:buFontTx/>
+              <a:buNone/>
+            </a:pPr>
+            <a:r>
+              <a:rPr lang="he-IL" baseline="0" dirty="0" smtClean="0"/>
+              <a:t>שלב הטרנספורמציה של המאפיינים יבוצע על ידי תהליך הלבנה וצביעה של מטריצת הקווריאנס אשר נמצא כיעיל במיוחד לצורך העברת הסטייל.</a:t>
+            </a:r>
+          </a:p>
+          <a:p>
+            <a:pPr algn="r" rtl="1">
+              <a:buFontTx/>
+              <a:buNone/>
+            </a:pPr>
+            <a:r>
+              <a:rPr lang="he-IL" baseline="0" dirty="0" smtClean="0"/>
+              <a:t>העיקרון בטרנספורציה הינו למצוא התאמה בין מטריצת הקווריאנס של מאפייני תמונת התוכן וזו של תמונת הסטייל עבור כל אחת מהשכבות של המאפיינים.</a:t>
+            </a:r>
+          </a:p>
+          <a:p>
+            <a:pPr algn="r" rtl="1">
+              <a:buFontTx/>
+              <a:buNone/>
+            </a:pPr>
+            <a:r>
+              <a:rPr lang="he-IL" baseline="0" dirty="0" smtClean="0"/>
+              <a:t>לאחר מכן, המאפיינים אשר עברו הלבנה וצביעה מועברים ל-</a:t>
+            </a:r>
+            <a:r>
+              <a:rPr lang="en-US" baseline="0" dirty="0" smtClean="0"/>
+              <a:t>decoder</a:t>
+            </a:r>
+            <a:r>
+              <a:rPr lang="he-IL" baseline="0" dirty="0" smtClean="0"/>
+              <a:t> לצורך שיחזור תמונת סטייל בשילוב התוכן של תמונת התוכן.</a:t>
+            </a:r>
+          </a:p>
+          <a:p>
+            <a:pPr algn="r" rtl="1">
+              <a:buFontTx/>
+              <a:buNone/>
+            </a:pPr>
+            <a:endParaRPr lang="en-US" baseline="0" dirty="0" smtClean="0"/>
+          </a:p>
+          <a:p>
+            <a:pPr algn="r" rtl="1">
               <a:buFontTx/>
               <a:buNone/>
             </a:pPr>
@@ -1297,6 +1834,7 @@
           <a:p>
             <a:fld id="{D403C2C2-E16D-4CBA-8509-EAAB4FB7A708}" type="slidenum">
               <a:rPr lang="en-US" smtClean="0"/>
+              <a:pPr/>
               <a:t>3</a:t>
             </a:fld>
             <a:endParaRPr lang="en-US"/>
@@ -1357,22 +1895,61 @@
           </a:bodyPr>
           <a:lstStyle/>
           <a:p>
+            <a:pPr algn="r"/>
+            <a:r>
+              <a:rPr lang="he-IL" baseline="0" dirty="0" smtClean="0"/>
+              <a:t>תהליך הלבנה מתבצע עבור כל אחת משכבות המאפיינים של תמונת התוכן בשכבה העמוקה ביותר של האנקודר.</a:t>
+            </a:r>
+          </a:p>
+          <a:p>
+            <a:pPr algn="r" rtl="1"/>
+            <a:r>
+              <a:rPr lang="he-IL" baseline="0" dirty="0" smtClean="0"/>
+              <a:t>עבור כל אחת מהשכבות נחשב סטטיסטיקה של המאפיינים, כלומר את מטריצת הקווריאנס של המאפיינים ובשלב הצביעה נבצע התאמה למטריצת הקווריאנס של תמונת הסטייל.</a:t>
+            </a:r>
+          </a:p>
+          <a:p>
+            <a:pPr algn="r" rtl="1"/>
+            <a:r>
+              <a:rPr lang="he-IL" baseline="0" dirty="0" smtClean="0"/>
+              <a:t>בשלב הראשון בהלבנה, נחסיר את הממוצע של המאפיינים בכל שכבה על מנת למרכז אותם.</a:t>
+            </a:r>
+          </a:p>
+          <a:p>
+            <a:pPr algn="r" rtl="1"/>
+            <a:r>
+              <a:rPr lang="he-IL" baseline="0" dirty="0" smtClean="0"/>
+              <a:t>לאחר מכן, נחשב את מטריצת הקווריאנס של המאפיינים ונבצע </a:t>
+            </a:r>
             <a:r>
               <a:rPr lang="en-US" baseline="0" dirty="0" smtClean="0"/>
-              <a:t>Carmi</a:t>
-            </a:r>
-          </a:p>
-          <a:p>
-            <a:r>
-              <a:rPr lang="en-US" baseline="0" dirty="0" smtClean="0"/>
-              <a:t>How </a:t>
-            </a:r>
-            <a:r>
-              <a:rPr lang="en-US" baseline="0" dirty="0" smtClean="0"/>
-              <a:t>do we use Feature Transform such as WCT for ST. Whitening, Coloring </a:t>
-            </a:r>
-          </a:p>
-          <a:p>
+              <a:t>singular value decomposition</a:t>
+            </a:r>
+            <a:r>
+              <a:rPr lang="he-IL" baseline="0" dirty="0" smtClean="0"/>
+              <a:t> על מטריצה זו בכדי לדאוג שהמאפיינים יהיו חסרי קורלציה ובעלי שונות 1. כלומר רעש לבן.</a:t>
+            </a:r>
+          </a:p>
+          <a:p>
+            <a:pPr algn="r" rtl="1"/>
+            <a:r>
+              <a:rPr lang="he-IL" baseline="0" dirty="0" smtClean="0"/>
+              <a:t>אם נחשב את הקווריאנס של המאפיינים לאחר שעברו הלבנה תתקבל מטריצת היחידה.</a:t>
+            </a:r>
+          </a:p>
+          <a:p>
+            <a:pPr algn="r" rtl="1"/>
+            <a:r>
+              <a:rPr lang="he-IL" baseline="0" dirty="0" smtClean="0"/>
+              <a:t>כל שנותר הוא לצבוע את המאפיינים המולבנים בסטטיסטיקה של מאפייני תמונת הסטייל.</a:t>
+            </a:r>
+          </a:p>
+          <a:p>
+            <a:pPr algn="r" rtl="1"/>
+            <a:endParaRPr lang="he-IL" baseline="0" dirty="0" smtClean="0"/>
+          </a:p>
+          <a:p>
+            <a:pPr algn="r" rtl="1"/>
             <a:endParaRPr lang="en-US" baseline="0" dirty="0" smtClean="0"/>
           </a:p>
         </p:txBody>
@@ -1394,6 +1971,7 @@
           <a:p>
             <a:fld id="{D403C2C2-E16D-4CBA-8509-EAAB4FB7A708}" type="slidenum">
               <a:rPr lang="en-US" smtClean="0"/>
+              <a:pPr/>
               <a:t>4</a:t>
             </a:fld>
             <a:endParaRPr lang="en-US"/>
@@ -1454,22 +2032,40 @@
           </a:bodyPr>
           <a:lstStyle/>
           <a:p>
+            <a:pPr algn="r" rtl="1"/>
+            <a:r>
+              <a:rPr lang="he-IL" baseline="0" dirty="0" smtClean="0"/>
+              <a:t>תהליך הצביעה הוא ההופכי של תהליך ההלבנה.</a:t>
+            </a:r>
+          </a:p>
+          <a:p>
+            <a:pPr algn="r" rtl="1"/>
+            <a:r>
+              <a:rPr lang="he-IL" baseline="0" dirty="0" smtClean="0"/>
+              <a:t>כלומר, בשלב זה יש בידינו מטריצת קווריאנס מולבנת של מאפייני התוכן.</a:t>
+            </a:r>
+          </a:p>
+          <a:p>
+            <a:pPr algn="r" rtl="1"/>
+            <a:r>
+              <a:rPr lang="he-IL" baseline="0" dirty="0" smtClean="0"/>
+              <a:t>נחלץ את המאפיינים הסטטיסטיים מתמונת הסטייל ע"י שימוש ב-</a:t>
+            </a:r>
             <a:r>
               <a:rPr lang="en-US" baseline="0" dirty="0" smtClean="0"/>
-              <a:t>Carmi</a:t>
-            </a:r>
-          </a:p>
-          <a:p>
-            <a:r>
-              <a:rPr lang="en-US" baseline="0" dirty="0" smtClean="0"/>
-              <a:t>How </a:t>
-            </a:r>
-            <a:r>
-              <a:rPr lang="en-US" baseline="0" dirty="0" smtClean="0"/>
-              <a:t>do we use Feature Transform such as WCT for ST. Whitening, Coloring </a:t>
-            </a:r>
-          </a:p>
-          <a:p>
+              <a:t>singular value decomposition</a:t>
+            </a:r>
+            <a:r>
+              <a:rPr lang="he-IL" baseline="0" dirty="0" smtClean="0"/>
+              <a:t> לתוך מטריצת ערכים עצמיים ווקטורים עצמיים וע"י הכפלתם במטריצת הקווריאנס המולבנת של תמונת התוכן </a:t>
+            </a:r>
+          </a:p>
+          <a:p>
+            <a:pPr algn="r" rtl="1"/>
+            <a:r>
+              <a:rPr lang="he-IL" baseline="0" dirty="0" smtClean="0"/>
+              <a:t>נקבל שכבות מאפיינים חדשות אשר צבועות בסטטיסטיקה של תמונת הסטייל תוך שמירה על התבנית של תמונת התוכן.</a:t>
+            </a:r>
             <a:endParaRPr lang="en-US" baseline="0" dirty="0" smtClean="0"/>
           </a:p>
         </p:txBody>
@@ -1491,6 +2087,7 @@
           <a:p>
             <a:fld id="{D403C2C2-E16D-4CBA-8509-EAAB4FB7A708}" type="slidenum">
               <a:rPr lang="en-US" smtClean="0"/>
+              <a:pPr/>
               <a:t>5</a:t>
             </a:fld>
             <a:endParaRPr lang="en-US"/>
@@ -1588,6 +2185,7 @@
           <a:p>
             <a:fld id="{D403C2C2-E16D-4CBA-8509-EAAB4FB7A708}" type="slidenum">
               <a:rPr lang="en-US" smtClean="0"/>
+              <a:pPr/>
               <a:t>6</a:t>
             </a:fld>
             <a:endParaRPr lang="en-US"/>
@@ -1597,7 +2195,7 @@
     </p:spTree>
     <p:extLst>
       <p:ext uri="{BB962C8B-B14F-4D97-AF65-F5344CB8AC3E}">
-        <p14:creationId xmlns:p14="http://schemas.microsoft.com/office/powerpoint/2010/main" val="3816270581"/>
+        <p14:creationId xmlns:p14="http://schemas.microsoft.com/office/powerpoint/2010/main" xmlns="" val="3816270581"/>
       </p:ext>
     </p:extLst>
   </p:cSld>
@@ -1740,6 +2338,7 @@
           <a:p>
             <a:fld id="{D403C2C2-E16D-4CBA-8509-EAAB4FB7A708}" type="slidenum">
               <a:rPr lang="en-US" smtClean="0"/>
+              <a:pPr/>
               <a:t>7</a:t>
             </a:fld>
             <a:endParaRPr lang="en-US"/>
@@ -1749,7 +2348,7 @@
     </p:spTree>
     <p:extLst>
       <p:ext uri="{BB962C8B-B14F-4D97-AF65-F5344CB8AC3E}">
-        <p14:creationId xmlns:p14="http://schemas.microsoft.com/office/powerpoint/2010/main" val="3816270581"/>
+        <p14:creationId xmlns:p14="http://schemas.microsoft.com/office/powerpoint/2010/main" xmlns="" val="3816270581"/>
       </p:ext>
     </p:extLst>
   </p:cSld>
@@ -1885,6 +2484,7 @@
           <a:p>
             <a:fld id="{D403C2C2-E16D-4CBA-8509-EAAB4FB7A708}" type="slidenum">
               <a:rPr lang="en-US" smtClean="0"/>
+              <a:pPr/>
               <a:t>8</a:t>
             </a:fld>
             <a:endParaRPr lang="en-US"/>
@@ -1894,7 +2494,7 @@
     </p:spTree>
     <p:extLst>
       <p:ext uri="{BB962C8B-B14F-4D97-AF65-F5344CB8AC3E}">
-        <p14:creationId xmlns:p14="http://schemas.microsoft.com/office/powerpoint/2010/main" val="1579804125"/>
+        <p14:creationId xmlns:p14="http://schemas.microsoft.com/office/powerpoint/2010/main" xmlns="" val="1579804125"/>
       </p:ext>
     </p:extLst>
   </p:cSld>
@@ -2039,6 +2639,7 @@
           <a:p>
             <a:fld id="{D403C2C2-E16D-4CBA-8509-EAAB4FB7A708}" type="slidenum">
               <a:rPr lang="en-US" smtClean="0"/>
+              <a:pPr/>
               <a:t>9</a:t>
             </a:fld>
             <a:endParaRPr lang="en-US"/>
@@ -2048,7 +2649,7 @@
     </p:spTree>
     <p:extLst>
       <p:ext uri="{BB962C8B-B14F-4D97-AF65-F5344CB8AC3E}">
-        <p14:creationId xmlns:p14="http://schemas.microsoft.com/office/powerpoint/2010/main" val="2507060001"/>
+        <p14:creationId xmlns:p14="http://schemas.microsoft.com/office/powerpoint/2010/main" xmlns="" val="2507060001"/>
       </p:ext>
     </p:extLst>
   </p:cSld>
@@ -2684,7 +3285,7 @@
             <a:fld id="{E6E985E8-094D-432C-AD96-489E57D7E58F}" type="datetimeFigureOut">
               <a:rPr lang="en-US" smtClean="0"/>
               <a:pPr/>
-              <a:t>23-Feb-19</a:t>
+              <a:t>2/23/2019</a:t>
             </a:fld>
             <a:endParaRPr lang="en-US"/>
           </a:p>
@@ -2882,7 +3483,7 @@
             <a:fld id="{E6E985E8-094D-432C-AD96-489E57D7E58F}" type="datetimeFigureOut">
               <a:rPr lang="en-US" smtClean="0"/>
               <a:pPr/>
-              <a:t>23-Feb-19</a:t>
+              <a:t>2/23/2019</a:t>
             </a:fld>
             <a:endParaRPr lang="en-US"/>
           </a:p>
@@ -3069,7 +3670,7 @@
             <a:fld id="{E6E985E8-094D-432C-AD96-489E57D7E58F}" type="datetimeFigureOut">
               <a:rPr lang="en-US" smtClean="0"/>
               <a:pPr/>
-              <a:t>23-Feb-19</a:t>
+              <a:t>2/23/2019</a:t>
             </a:fld>
             <a:endParaRPr lang="en-US"/>
           </a:p>
@@ -3221,7 +3822,7 @@
             <a:fld id="{E6E985E8-094D-432C-AD96-489E57D7E58F}" type="datetimeFigureOut">
               <a:rPr lang="en-US" smtClean="0"/>
               <a:pPr/>
-              <a:t>23-Feb-19</a:t>
+              <a:t>2/23/2019</a:t>
             </a:fld>
             <a:endParaRPr lang="en-US"/>
           </a:p>
@@ -3478,7 +4079,7 @@
             <a:fld id="{E6E985E8-094D-432C-AD96-489E57D7E58F}" type="datetimeFigureOut">
               <a:rPr lang="en-US" smtClean="0"/>
               <a:pPr/>
-              <a:t>23-Feb-19</a:t>
+              <a:t>2/23/2019</a:t>
             </a:fld>
             <a:endParaRPr lang="en-US"/>
           </a:p>
@@ -3889,7 +4490,7 @@
             <a:fld id="{E6E985E8-094D-432C-AD96-489E57D7E58F}" type="datetimeFigureOut">
               <a:rPr lang="en-US" smtClean="0"/>
               <a:pPr/>
-              <a:t>23-Feb-19</a:t>
+              <a:t>2/23/2019</a:t>
             </a:fld>
             <a:endParaRPr lang="en-US"/>
           </a:p>
@@ -4337,7 +4938,7 @@
             <a:fld id="{E6E985E8-094D-432C-AD96-489E57D7E58F}" type="datetimeFigureOut">
               <a:rPr lang="en-US" smtClean="0"/>
               <a:pPr/>
-              <a:t>23-Feb-19</a:t>
+              <a:t>2/23/2019</a:t>
             </a:fld>
             <a:endParaRPr lang="en-US"/>
           </a:p>
@@ -4440,7 +5041,7 @@
             <a:fld id="{E6E985E8-094D-432C-AD96-489E57D7E58F}" type="datetimeFigureOut">
               <a:rPr lang="en-US" smtClean="0"/>
               <a:pPr/>
-              <a:t>23-Feb-19</a:t>
+              <a:t>2/23/2019</a:t>
             </a:fld>
             <a:endParaRPr lang="en-US"/>
           </a:p>
@@ -4563,7 +5164,7 @@
             <a:fld id="{E6E985E8-094D-432C-AD96-489E57D7E58F}" type="datetimeFigureOut">
               <a:rPr lang="en-US" smtClean="0"/>
               <a:pPr/>
-              <a:t>23-Feb-19</a:t>
+              <a:t>2/23/2019</a:t>
             </a:fld>
             <a:endParaRPr lang="en-US"/>
           </a:p>
@@ -4839,7 +5440,7 @@
             <a:fld id="{E6E985E8-094D-432C-AD96-489E57D7E58F}" type="datetimeFigureOut">
               <a:rPr lang="en-US" smtClean="0"/>
               <a:pPr/>
-              <a:t>23-Feb-19</a:t>
+              <a:t>2/23/2019</a:t>
             </a:fld>
             <a:endParaRPr lang="en-US"/>
           </a:p>
@@ -5046,7 +5647,7 @@
             <a:fld id="{E6E985E8-094D-432C-AD96-489E57D7E58F}" type="datetimeFigureOut">
               <a:rPr lang="en-US" smtClean="0"/>
               <a:pPr/>
-              <a:t>23-Feb-19</a:t>
+              <a:t>2/23/2019</a:t>
             </a:fld>
             <a:endParaRPr lang="en-US"/>
           </a:p>
@@ -6157,7 +6758,7 @@
             <a:fld id="{E6E985E8-094D-432C-AD96-489E57D7E58F}" type="datetimeFigureOut">
               <a:rPr lang="en-US" smtClean="0"/>
               <a:pPr/>
-              <a:t>23-Feb-19</a:t>
+              <a:t>2/23/2019</a:t>
             </a:fld>
             <a:endParaRPr lang="en-US"/>
           </a:p>
@@ -8340,8 +8941,8 @@
           </a:p>
         </p:txBody>
       </p:sp>
-      <mc:AlternateContent xmlns:mc="http://schemas.openxmlformats.org/markup-compatibility/2006" xmlns:a14="http://schemas.microsoft.com/office/drawing/2010/main">
-        <mc:Choice Requires="a14">
+      <mc:AlternateContent xmlns:mc="http://schemas.openxmlformats.org/markup-compatibility/2006">
+        <mc:Choice xmlns:a14="http://schemas.microsoft.com/office/drawing/2010/main" xmlns="" Requires="a14">
           <p:sp>
             <p:nvSpPr>
               <p:cNvPr id="24" name="TextBox 23"/>
@@ -8429,7 +9030,7 @@
             </p:txBody>
           </p:sp>
         </mc:Choice>
-        <mc:Fallback xmlns="">
+        <mc:Fallback>
           <p:sp>
             <p:nvSpPr>
               <p:cNvPr id="24" name="TextBox 23"/>
@@ -8468,8 +9069,8 @@
           </p:sp>
         </mc:Fallback>
       </mc:AlternateContent>
-      <mc:AlternateContent xmlns:mc="http://schemas.openxmlformats.org/markup-compatibility/2006" xmlns:a14="http://schemas.microsoft.com/office/drawing/2010/main">
-        <mc:Choice Requires="a14">
+      <mc:AlternateContent xmlns:mc="http://schemas.openxmlformats.org/markup-compatibility/2006">
+        <mc:Choice xmlns:a14="http://schemas.microsoft.com/office/drawing/2010/main" xmlns="" Requires="a14">
           <p:sp>
             <p:nvSpPr>
               <p:cNvPr id="40" name="TextBox 39"/>
@@ -8557,7 +9158,7 @@
             </p:txBody>
           </p:sp>
         </mc:Choice>
-        <mc:Fallback xmlns="">
+        <mc:Fallback>
           <p:sp>
             <p:nvSpPr>
               <p:cNvPr id="40" name="TextBox 39"/>
@@ -8596,8 +9197,8 @@
           </p:sp>
         </mc:Fallback>
       </mc:AlternateContent>
-      <mc:AlternateContent xmlns:mc="http://schemas.openxmlformats.org/markup-compatibility/2006" xmlns:a14="http://schemas.microsoft.com/office/drawing/2010/main">
-        <mc:Choice Requires="a14">
+      <mc:AlternateContent xmlns:mc="http://schemas.openxmlformats.org/markup-compatibility/2006">
+        <mc:Choice xmlns:a14="http://schemas.microsoft.com/office/drawing/2010/main" xmlns="" Requires="a14">
           <p:sp>
             <p:nvSpPr>
               <p:cNvPr id="41" name="TextBox 40"/>
@@ -8679,7 +9280,7 @@
             </p:txBody>
           </p:sp>
         </mc:Choice>
-        <mc:Fallback xmlns="">
+        <mc:Fallback>
           <p:sp>
             <p:nvSpPr>
               <p:cNvPr id="41" name="TextBox 40"/>
@@ -8718,8 +9319,8 @@
           </p:sp>
         </mc:Fallback>
       </mc:AlternateContent>
-      <mc:AlternateContent xmlns:mc="http://schemas.openxmlformats.org/markup-compatibility/2006" xmlns:a14="http://schemas.microsoft.com/office/drawing/2010/main">
-        <mc:Choice Requires="a14">
+      <mc:AlternateContent xmlns:mc="http://schemas.openxmlformats.org/markup-compatibility/2006">
+        <mc:Choice xmlns:a14="http://schemas.microsoft.com/office/drawing/2010/main" xmlns="" Requires="a14">
           <p:sp>
             <p:nvSpPr>
               <p:cNvPr id="44" name="TextBox 43"/>
@@ -8801,7 +9402,7 @@
             </p:txBody>
           </p:sp>
         </mc:Choice>
-        <mc:Fallback xmlns="">
+        <mc:Fallback>
           <p:sp>
             <p:nvSpPr>
               <p:cNvPr id="44" name="TextBox 43"/>
@@ -8840,8 +9441,8 @@
           </p:sp>
         </mc:Fallback>
       </mc:AlternateContent>
-      <mc:AlternateContent xmlns:mc="http://schemas.openxmlformats.org/markup-compatibility/2006" xmlns:a14="http://schemas.microsoft.com/office/drawing/2010/main">
-        <mc:Choice Requires="a14">
+      <mc:AlternateContent xmlns:mc="http://schemas.openxmlformats.org/markup-compatibility/2006">
+        <mc:Choice xmlns:a14="http://schemas.microsoft.com/office/drawing/2010/main" xmlns="" Requires="a14">
           <p:sp>
             <p:nvSpPr>
               <p:cNvPr id="46" name="TextBox 45"/>
@@ -8904,7 +9505,7 @@
             </p:txBody>
           </p:sp>
         </mc:Choice>
-        <mc:Fallback xmlns="">
+        <mc:Fallback>
           <p:sp>
             <p:nvSpPr>
               <p:cNvPr id="46" name="TextBox 45"/>
@@ -8943,8 +9544,8 @@
           </p:sp>
         </mc:Fallback>
       </mc:AlternateContent>
-      <mc:AlternateContent xmlns:mc="http://schemas.openxmlformats.org/markup-compatibility/2006" xmlns:a14="http://schemas.microsoft.com/office/drawing/2010/main">
-        <mc:Choice Requires="a14">
+      <mc:AlternateContent xmlns:mc="http://schemas.openxmlformats.org/markup-compatibility/2006">
+        <mc:Choice xmlns:a14="http://schemas.microsoft.com/office/drawing/2010/main" xmlns="" Requires="a14">
           <p:sp>
             <p:nvSpPr>
               <p:cNvPr id="6" name="TextBox 5"/>
@@ -9129,7 +9730,7 @@
             </p:txBody>
           </p:sp>
         </mc:Choice>
-        <mc:Fallback xmlns="">
+        <mc:Fallback>
           <p:sp>
             <p:nvSpPr>
               <p:cNvPr id="6" name="TextBox 5"/>
@@ -10076,8 +10677,8 @@
           </a:p>
         </p:txBody>
       </p:sp>
-      <mc:AlternateContent xmlns:mc="http://schemas.openxmlformats.org/markup-compatibility/2006" xmlns:a14="http://schemas.microsoft.com/office/drawing/2010/main">
-        <mc:Choice Requires="a14">
+      <mc:AlternateContent xmlns:mc="http://schemas.openxmlformats.org/markup-compatibility/2006">
+        <mc:Choice xmlns:a14="http://schemas.microsoft.com/office/drawing/2010/main" xmlns="" Requires="a14">
           <p:sp>
             <p:nvSpPr>
               <p:cNvPr id="24" name="TextBox 23"/>
@@ -10171,7 +10772,7 @@
             </p:txBody>
           </p:sp>
         </mc:Choice>
-        <mc:Fallback xmlns="">
+        <mc:Fallback>
           <p:sp>
             <p:nvSpPr>
               <p:cNvPr id="24" name="TextBox 23"/>
@@ -10210,8 +10811,8 @@
           </p:sp>
         </mc:Fallback>
       </mc:AlternateContent>
-      <mc:AlternateContent xmlns:mc="http://schemas.openxmlformats.org/markup-compatibility/2006" xmlns:a14="http://schemas.microsoft.com/office/drawing/2010/main">
-        <mc:Choice Requires="a14">
+      <mc:AlternateContent xmlns:mc="http://schemas.openxmlformats.org/markup-compatibility/2006">
+        <mc:Choice xmlns:a14="http://schemas.microsoft.com/office/drawing/2010/main" xmlns="" Requires="a14">
           <p:sp>
             <p:nvSpPr>
               <p:cNvPr id="41" name="TextBox 40"/>
@@ -10293,7 +10894,7 @@
             </p:txBody>
           </p:sp>
         </mc:Choice>
-        <mc:Fallback xmlns="">
+        <mc:Fallback>
           <p:sp>
             <p:nvSpPr>
               <p:cNvPr id="41" name="TextBox 40"/>
@@ -10332,8 +10933,8 @@
           </p:sp>
         </mc:Fallback>
       </mc:AlternateContent>
-      <mc:AlternateContent xmlns:mc="http://schemas.openxmlformats.org/markup-compatibility/2006" xmlns:a14="http://schemas.microsoft.com/office/drawing/2010/main">
-        <mc:Choice Requires="a14">
+      <mc:AlternateContent xmlns:mc="http://schemas.openxmlformats.org/markup-compatibility/2006">
+        <mc:Choice xmlns:a14="http://schemas.microsoft.com/office/drawing/2010/main" xmlns="" Requires="a14">
           <p:sp>
             <p:nvSpPr>
               <p:cNvPr id="44" name="TextBox 43"/>
@@ -10415,7 +11016,7 @@
             </p:txBody>
           </p:sp>
         </mc:Choice>
-        <mc:Fallback xmlns="">
+        <mc:Fallback>
           <p:sp>
             <p:nvSpPr>
               <p:cNvPr id="44" name="TextBox 43"/>
@@ -10454,8 +11055,8 @@
           </p:sp>
         </mc:Fallback>
       </mc:AlternateContent>
-      <mc:AlternateContent xmlns:mc="http://schemas.openxmlformats.org/markup-compatibility/2006" xmlns:a14="http://schemas.microsoft.com/office/drawing/2010/main">
-        <mc:Choice Requires="a14">
+      <mc:AlternateContent xmlns:mc="http://schemas.openxmlformats.org/markup-compatibility/2006">
+        <mc:Choice xmlns:a14="http://schemas.microsoft.com/office/drawing/2010/main" xmlns="" Requires="a14">
           <p:sp>
             <p:nvSpPr>
               <p:cNvPr id="46" name="TextBox 45"/>
@@ -10518,7 +11119,7 @@
             </p:txBody>
           </p:sp>
         </mc:Choice>
-        <mc:Fallback xmlns="">
+        <mc:Fallback>
           <p:sp>
             <p:nvSpPr>
               <p:cNvPr id="46" name="TextBox 45"/>
@@ -10735,8 +11336,8 @@
           <a:noFill/>
         </p:spPr>
       </p:pic>
-      <mc:AlternateContent xmlns:mc="http://schemas.openxmlformats.org/markup-compatibility/2006" xmlns:a14="http://schemas.microsoft.com/office/drawing/2010/main">
-        <mc:Choice Requires="a14">
+      <mc:AlternateContent xmlns:mc="http://schemas.openxmlformats.org/markup-compatibility/2006">
+        <mc:Choice xmlns:a14="http://schemas.microsoft.com/office/drawing/2010/main" xmlns="" Requires="a14">
           <p:sp>
             <p:nvSpPr>
               <p:cNvPr id="49" name="TextBox 48"/>
@@ -10799,7 +11400,7 @@
             </p:txBody>
           </p:sp>
         </mc:Choice>
-        <mc:Fallback xmlns="">
+        <mc:Fallback>
           <p:sp>
             <p:nvSpPr>
               <p:cNvPr id="49" name="TextBox 48"/>
@@ -10841,7 +11442,7 @@
     </p:spTree>
     <p:extLst>
       <p:ext uri="{BB962C8B-B14F-4D97-AF65-F5344CB8AC3E}">
-        <p14:creationId xmlns:p14="http://schemas.microsoft.com/office/powerpoint/2010/main" val="1611528961"/>
+        <p14:creationId xmlns:p14="http://schemas.microsoft.com/office/powerpoint/2010/main" xmlns="" val="1611528961"/>
       </p:ext>
     </p:extLst>
   </p:cSld>
@@ -11861,7 +12462,7 @@
         </p:txBody>
       </p:sp>
       <mc:AlternateContent xmlns:mc="http://schemas.openxmlformats.org/markup-compatibility/2006">
-        <mc:Choice xmlns:a14="http://schemas.microsoft.com/office/drawing/2010/main" Requires="a14">
+        <mc:Choice xmlns:a14="http://schemas.microsoft.com/office/drawing/2010/main" xmlns="" Requires="a14">
           <p:sp>
             <p:nvSpPr>
               <p:cNvPr id="33" name="TextBox 32"/>
@@ -11961,7 +12562,7 @@
                 <a:avLst/>
               </a:prstGeom>
               <a:blipFill rotWithShape="1">
-                <a:blip r:embed="rId15"/>
+                <a:blip r:embed="rId15" cstate="print"/>
                 <a:stretch>
                   <a:fillRect b="-6154"/>
                 </a:stretch>
@@ -11983,7 +12584,7 @@
         </mc:Fallback>
       </mc:AlternateContent>
       <mc:AlternateContent xmlns:mc="http://schemas.openxmlformats.org/markup-compatibility/2006">
-        <mc:Choice xmlns:a14="http://schemas.microsoft.com/office/drawing/2010/main" Requires="a14">
+        <mc:Choice xmlns:a14="http://schemas.microsoft.com/office/drawing/2010/main" xmlns="" Requires="a14">
           <p:sp>
             <p:nvSpPr>
               <p:cNvPr id="41" name="TextBox 40"/>
@@ -12083,7 +12684,7 @@
                 <a:avLst/>
               </a:prstGeom>
               <a:blipFill rotWithShape="1">
-                <a:blip r:embed="rId16"/>
+                <a:blip r:embed="rId16" cstate="print"/>
                 <a:stretch>
                   <a:fillRect b="-6154"/>
                 </a:stretch>
@@ -12105,7 +12706,7 @@
         </mc:Fallback>
       </mc:AlternateContent>
       <mc:AlternateContent xmlns:mc="http://schemas.openxmlformats.org/markup-compatibility/2006">
-        <mc:Choice xmlns:a14="http://schemas.microsoft.com/office/drawing/2010/main" Requires="a14">
+        <mc:Choice xmlns:a14="http://schemas.microsoft.com/office/drawing/2010/main" xmlns="" Requires="a14">
           <p:sp>
             <p:nvSpPr>
               <p:cNvPr id="50" name="TextBox 49"/>
@@ -12186,7 +12787,7 @@
                 <a:avLst/>
               </a:prstGeom>
               <a:blipFill rotWithShape="1">
-                <a:blip r:embed="rId17"/>
+                <a:blip r:embed="rId17" cstate="print"/>
                 <a:stretch>
                   <a:fillRect b="-8197"/>
                 </a:stretch>
@@ -12208,7 +12809,7 @@
         </mc:Fallback>
       </mc:AlternateContent>
       <mc:AlternateContent xmlns:mc="http://schemas.openxmlformats.org/markup-compatibility/2006">
-        <mc:Choice xmlns:a14="http://schemas.microsoft.com/office/drawing/2010/main" Requires="a14">
+        <mc:Choice xmlns:a14="http://schemas.microsoft.com/office/drawing/2010/main" xmlns="" Requires="a14">
           <p:sp>
             <p:nvSpPr>
               <p:cNvPr id="55" name="TextBox 54"/>
@@ -12289,7 +12890,7 @@
                 <a:avLst/>
               </a:prstGeom>
               <a:blipFill rotWithShape="1">
-                <a:blip r:embed="rId18"/>
+                <a:blip r:embed="rId18" cstate="print"/>
                 <a:stretch>
                   <a:fillRect b="-8197"/>
                 </a:stretch>
@@ -12311,7 +12912,7 @@
         </mc:Fallback>
       </mc:AlternateContent>
       <mc:AlternateContent xmlns:mc="http://schemas.openxmlformats.org/markup-compatibility/2006">
-        <mc:Choice xmlns:a14="http://schemas.microsoft.com/office/drawing/2010/main" Requires="a14">
+        <mc:Choice xmlns:a14="http://schemas.microsoft.com/office/drawing/2010/main" xmlns="" Requires="a14">
           <p:sp>
             <p:nvSpPr>
               <p:cNvPr id="4" name="TextBox 3"/>
@@ -12501,7 +13102,7 @@
                 <a:avLst/>
               </a:prstGeom>
               <a:blipFill rotWithShape="1">
-                <a:blip r:embed="rId19"/>
+                <a:blip r:embed="rId19" cstate="print"/>
                 <a:stretch>
                   <a:fillRect b="-3333"/>
                 </a:stretch>
@@ -12615,7 +13216,7 @@
           <a:blip r:embed="rId4" cstate="print">
             <a:extLst>
               <a:ext uri="{28A0092B-C50C-407E-A947-70E740481C1C}">
-                <a14:useLocalDpi xmlns:a14="http://schemas.microsoft.com/office/drawing/2010/main" val="0"/>
+                <a14:useLocalDpi xmlns:a14="http://schemas.microsoft.com/office/drawing/2010/main" xmlns="" val="0"/>
               </a:ext>
             </a:extLst>
           </a:blip>
@@ -12635,7 +13236,7 @@
           <a:noFill/>
           <a:extLst>
             <a:ext uri="{909E8E84-426E-40DD-AFC4-6F175D3DCCD1}">
-              <a14:hiddenFill xmlns:a14="http://schemas.microsoft.com/office/drawing/2010/main">
+              <a14:hiddenFill xmlns:a14="http://schemas.microsoft.com/office/drawing/2010/main" xmlns="">
                 <a:solidFill>
                   <a:srgbClr val="FFFFFF"/>
                 </a:solidFill>
@@ -13021,7 +13622,7 @@
     </p:spTree>
     <p:extLst>
       <p:ext uri="{BB962C8B-B14F-4D97-AF65-F5344CB8AC3E}">
-        <p14:creationId xmlns:p14="http://schemas.microsoft.com/office/powerpoint/2010/main" val="2914909516"/>
+        <p14:creationId xmlns:p14="http://schemas.microsoft.com/office/powerpoint/2010/main" xmlns="" val="2914909516"/>
       </p:ext>
     </p:extLst>
   </p:cSld>
@@ -13270,7 +13871,7 @@
     </p:spTree>
     <p:extLst>
       <p:ext uri="{BB962C8B-B14F-4D97-AF65-F5344CB8AC3E}">
-        <p14:creationId xmlns:p14="http://schemas.microsoft.com/office/powerpoint/2010/main" val="1074707105"/>
+        <p14:creationId xmlns:p14="http://schemas.microsoft.com/office/powerpoint/2010/main" xmlns="" val="1074707105"/>
       </p:ext>
     </p:extLst>
   </p:cSld>
@@ -13451,7 +14052,7 @@
         </a:xfrm>
       </p:grpSpPr>
       <mc:AlternateContent xmlns:mc="http://schemas.openxmlformats.org/markup-compatibility/2006">
-        <mc:Choice xmlns:a14="http://schemas.microsoft.com/office/drawing/2010/main" Requires="a14">
+        <mc:Choice xmlns:a14="http://schemas.microsoft.com/office/drawing/2010/main" xmlns="" Requires="a14">
           <p:sp>
             <p:nvSpPr>
               <p:cNvPr id="2" name="Content Placeholder 1"/>
@@ -13952,7 +14553,7 @@
             </p:nvSpPr>
             <p:spPr>
               <a:blipFill rotWithShape="1">
-                <a:blip r:embed="rId3"/>
+                <a:blip r:embed="rId3" cstate="print"/>
                 <a:stretch>
                   <a:fillRect t="-1213"/>
                 </a:stretch>
@@ -14029,7 +14630,7 @@
         </a:xfrm>
       </p:grpSpPr>
       <mc:AlternateContent xmlns:mc="http://schemas.openxmlformats.org/markup-compatibility/2006">
-        <mc:Choice xmlns:a14="http://schemas.microsoft.com/office/drawing/2010/main" Requires="a14">
+        <mc:Choice xmlns:a14="http://schemas.microsoft.com/office/drawing/2010/main" xmlns="" Requires="a14">
           <p:sp>
             <p:nvSpPr>
               <p:cNvPr id="2" name="Content Placeholder 1"/>
@@ -14862,7 +15463,7 @@
             </p:nvSpPr>
             <p:spPr>
               <a:blipFill rotWithShape="1">
-                <a:blip r:embed="rId3"/>
+                <a:blip r:embed="rId3" cstate="print"/>
                 <a:stretch>
                   <a:fillRect t="-1213"/>
                 </a:stretch>
@@ -14909,7 +15510,7 @@
     </p:spTree>
     <p:extLst>
       <p:ext uri="{BB962C8B-B14F-4D97-AF65-F5344CB8AC3E}">
-        <p14:creationId xmlns:p14="http://schemas.microsoft.com/office/powerpoint/2010/main" val="913235897"/>
+        <p14:creationId xmlns:p14="http://schemas.microsoft.com/office/powerpoint/2010/main" xmlns="" val="913235897"/>
       </p:ext>
     </p:extLst>
   </p:cSld>
@@ -15275,7 +15876,7 @@
         </p:txBody>
       </p:sp>
       <mc:AlternateContent xmlns:mc="http://schemas.openxmlformats.org/markup-compatibility/2006">
-        <mc:Choice xmlns:a14="http://schemas.microsoft.com/office/drawing/2010/main" Requires="a14">
+        <mc:Choice xmlns:a14="http://schemas.microsoft.com/office/drawing/2010/main" xmlns="" Requires="a14">
           <p:sp>
             <p:nvSpPr>
               <p:cNvPr id="4" name="TextBox 3"/>
@@ -15529,7 +16130,7 @@
                 <a:avLst/>
               </a:prstGeom>
               <a:blipFill rotWithShape="1">
-                <a:blip r:embed="rId4"/>
+                <a:blip r:embed="rId4" cstate="print"/>
                 <a:stretch>
                   <a:fillRect l="-814" t="-1701" r="-509" b="-4422"/>
                 </a:stretch>
@@ -15553,7 +16154,7 @@
     </p:spTree>
     <p:extLst>
       <p:ext uri="{BB962C8B-B14F-4D97-AF65-F5344CB8AC3E}">
-        <p14:creationId xmlns:p14="http://schemas.microsoft.com/office/powerpoint/2010/main" val="241298553"/>
+        <p14:creationId xmlns:p14="http://schemas.microsoft.com/office/powerpoint/2010/main" xmlns="" val="241298553"/>
       </p:ext>
     </p:extLst>
   </p:cSld>
@@ -16355,7 +16956,7 @@
           <a:blip r:embed="rId10" cstate="print">
             <a:extLst>
               <a:ext uri="{28A0092B-C50C-407E-A947-70E740481C1C}">
-                <a14:useLocalDpi xmlns:a14="http://schemas.microsoft.com/office/drawing/2010/main" val="0"/>
+                <a14:useLocalDpi xmlns:a14="http://schemas.microsoft.com/office/drawing/2010/main" xmlns="" val="0"/>
               </a:ext>
             </a:extLst>
           </a:blip>
@@ -16378,14 +16979,14 @@
           </a:ln>
           <a:extLst>
             <a:ext uri="{909E8E84-426E-40DD-AFC4-6F175D3DCCD1}">
-              <a14:hiddenFill xmlns:a14="http://schemas.microsoft.com/office/drawing/2010/main">
+              <a14:hiddenFill xmlns:a14="http://schemas.microsoft.com/office/drawing/2010/main" xmlns="">
                 <a:solidFill>
                   <a:schemeClr val="accent1"/>
                 </a:solidFill>
               </a14:hiddenFill>
             </a:ext>
             <a:ext uri="{91240B29-F687-4F45-9708-019B960494DF}">
-              <a14:hiddenLine xmlns:a14="http://schemas.microsoft.com/office/drawing/2010/main" w="9525">
+              <a14:hiddenLine xmlns:a14="http://schemas.microsoft.com/office/drawing/2010/main" xmlns="" w="9525">
                 <a:solidFill>
                   <a:schemeClr val="tx1"/>
                 </a:solidFill>

</xml_diff>